<commit_message>
9 and 10 added
</commit_message>
<xml_diff>
--- a/Notes/pl_sql_views_procedure.pptx
+++ b/Notes/pl_sql_views_procedure.pptx
@@ -163,6 +163,35 @@
 </p:presentation>
 </file>
 
+<file path=ppt/changesInfos/changesInfo1.xml><?xml version="1.0" encoding="utf-8"?>
+<pc:chgInfo xmlns:a="http://schemas.openxmlformats.org/drawingml/2006/main" xmlns:r="http://schemas.openxmlformats.org/officeDocument/2006/relationships" xmlns:ac="http://schemas.microsoft.com/office/drawing/2013/main/command" xmlns:pc="http://schemas.microsoft.com/office/powerpoint/2013/main/command">
+  <pc:docChgLst>
+    <pc:chgData name="Ashutosh Yadav" userId="693f43e9718cbd6b" providerId="LiveId" clId="{AF52BFE7-3122-467A-95AF-97BEAD143E2C}"/>
+    <pc:docChg chg="modSld">
+      <pc:chgData name="Ashutosh Yadav" userId="693f43e9718cbd6b" providerId="LiveId" clId="{AF52BFE7-3122-467A-95AF-97BEAD143E2C}" dt="2025-10-05T17:58:14.833" v="1" actId="1036"/>
+      <pc:docMkLst>
+        <pc:docMk/>
+      </pc:docMkLst>
+      <pc:sldChg chg="modSp mod">
+        <pc:chgData name="Ashutosh Yadav" userId="693f43e9718cbd6b" providerId="LiveId" clId="{AF52BFE7-3122-467A-95AF-97BEAD143E2C}" dt="2025-10-05T17:58:14.833" v="1" actId="1036"/>
+        <pc:sldMkLst>
+          <pc:docMk/>
+          <pc:sldMk cId="3519594111" sldId="266"/>
+        </pc:sldMkLst>
+        <pc:picChg chg="mod">
+          <ac:chgData name="Ashutosh Yadav" userId="693f43e9718cbd6b" providerId="LiveId" clId="{AF52BFE7-3122-467A-95AF-97BEAD143E2C}" dt="2025-10-05T17:58:14.833" v="1" actId="1036"/>
+          <ac:picMkLst>
+            <pc:docMk/>
+            <pc:sldMk cId="3519594111" sldId="266"/>
+            <ac:picMk id="4" creationId="{B8641008-E11F-2E46-EF75-9868EA0C5A59}"/>
+          </ac:picMkLst>
+        </pc:picChg>
+      </pc:sldChg>
+    </pc:docChg>
+  </pc:docChgLst>
+</pc:chgInfo>
+</file>
+
 <file path=ppt/notesMasters/notesMaster1.xml><?xml version="1.0" encoding="utf-8"?>
 <p:notesMaster xmlns:a="http://schemas.openxmlformats.org/drawingml/2006/main" xmlns:r="http://schemas.openxmlformats.org/officeDocument/2006/relationships" xmlns:p="http://schemas.openxmlformats.org/presentationml/2006/main">
   <p:cSld>
@@ -245,7 +274,7 @@
           <a:p>
             <a:fld id="{A1B704AF-1117-4FCD-883C-7AEA7A3B160E}" type="datetimeFigureOut">
               <a:rPr lang="en-IN" smtClean="0"/>
-              <a:t>20-09-2025</a:t>
+              <a:t>05-10-2025</a:t>
             </a:fld>
             <a:endParaRPr lang="en-IN"/>
           </a:p>
@@ -3570,7 +3599,7 @@
           <a:p>
             <a:fld id="{869628CB-11F6-46B8-B639-18C23171EB0C}" type="datetimeFigureOut">
               <a:rPr lang="en-IN" smtClean="0"/>
-              <a:t>20-09-2025</a:t>
+              <a:t>05-10-2025</a:t>
             </a:fld>
             <a:endParaRPr lang="en-IN"/>
           </a:p>
@@ -3770,7 +3799,7 @@
           <a:p>
             <a:fld id="{869628CB-11F6-46B8-B639-18C23171EB0C}" type="datetimeFigureOut">
               <a:rPr lang="en-IN" smtClean="0"/>
-              <a:t>20-09-2025</a:t>
+              <a:t>05-10-2025</a:t>
             </a:fld>
             <a:endParaRPr lang="en-IN"/>
           </a:p>
@@ -3980,7 +4009,7 @@
           <a:p>
             <a:fld id="{869628CB-11F6-46B8-B639-18C23171EB0C}" type="datetimeFigureOut">
               <a:rPr lang="en-IN" smtClean="0"/>
-              <a:t>20-09-2025</a:t>
+              <a:t>05-10-2025</a:t>
             </a:fld>
             <a:endParaRPr lang="en-IN"/>
           </a:p>
@@ -4180,7 +4209,7 @@
           <a:p>
             <a:fld id="{869628CB-11F6-46B8-B639-18C23171EB0C}" type="datetimeFigureOut">
               <a:rPr lang="en-IN" smtClean="0"/>
-              <a:t>20-09-2025</a:t>
+              <a:t>05-10-2025</a:t>
             </a:fld>
             <a:endParaRPr lang="en-IN"/>
           </a:p>
@@ -4456,7 +4485,7 @@
           <a:p>
             <a:fld id="{869628CB-11F6-46B8-B639-18C23171EB0C}" type="datetimeFigureOut">
               <a:rPr lang="en-IN" smtClean="0"/>
-              <a:t>20-09-2025</a:t>
+              <a:t>05-10-2025</a:t>
             </a:fld>
             <a:endParaRPr lang="en-IN"/>
           </a:p>
@@ -4724,7 +4753,7 @@
           <a:p>
             <a:fld id="{869628CB-11F6-46B8-B639-18C23171EB0C}" type="datetimeFigureOut">
               <a:rPr lang="en-IN" smtClean="0"/>
-              <a:t>20-09-2025</a:t>
+              <a:t>05-10-2025</a:t>
             </a:fld>
             <a:endParaRPr lang="en-IN"/>
           </a:p>
@@ -5139,7 +5168,7 @@
           <a:p>
             <a:fld id="{869628CB-11F6-46B8-B639-18C23171EB0C}" type="datetimeFigureOut">
               <a:rPr lang="en-IN" smtClean="0"/>
-              <a:t>20-09-2025</a:t>
+              <a:t>05-10-2025</a:t>
             </a:fld>
             <a:endParaRPr lang="en-IN"/>
           </a:p>
@@ -5281,7 +5310,7 @@
           <a:p>
             <a:fld id="{869628CB-11F6-46B8-B639-18C23171EB0C}" type="datetimeFigureOut">
               <a:rPr lang="en-IN" smtClean="0"/>
-              <a:t>20-09-2025</a:t>
+              <a:t>05-10-2025</a:t>
             </a:fld>
             <a:endParaRPr lang="en-IN"/>
           </a:p>
@@ -5394,7 +5423,7 @@
           <a:p>
             <a:fld id="{869628CB-11F6-46B8-B639-18C23171EB0C}" type="datetimeFigureOut">
               <a:rPr lang="en-IN" smtClean="0"/>
-              <a:t>20-09-2025</a:t>
+              <a:t>05-10-2025</a:t>
             </a:fld>
             <a:endParaRPr lang="en-IN"/>
           </a:p>
@@ -5707,7 +5736,7 @@
           <a:p>
             <a:fld id="{869628CB-11F6-46B8-B639-18C23171EB0C}" type="datetimeFigureOut">
               <a:rPr lang="en-IN" smtClean="0"/>
-              <a:t>20-09-2025</a:t>
+              <a:t>05-10-2025</a:t>
             </a:fld>
             <a:endParaRPr lang="en-IN"/>
           </a:p>
@@ -5996,7 +6025,7 @@
           <a:p>
             <a:fld id="{869628CB-11F6-46B8-B639-18C23171EB0C}" type="datetimeFigureOut">
               <a:rPr lang="en-IN" smtClean="0"/>
-              <a:t>20-09-2025</a:t>
+              <a:t>05-10-2025</a:t>
             </a:fld>
             <a:endParaRPr lang="en-IN"/>
           </a:p>
@@ -6239,7 +6268,7 @@
           <a:p>
             <a:fld id="{869628CB-11F6-46B8-B639-18C23171EB0C}" type="datetimeFigureOut">
               <a:rPr lang="en-IN" smtClean="0"/>
-              <a:t>20-09-2025</a:t>
+              <a:t>05-10-2025</a:t>
             </a:fld>
             <a:endParaRPr lang="en-IN"/>
           </a:p>
@@ -6957,7 +6986,7 @@
         </p:blipFill>
         <p:spPr>
           <a:xfrm>
-            <a:off x="838200" y="2129913"/>
+            <a:off x="838200" y="2148201"/>
             <a:ext cx="7760578" cy="2923349"/>
           </a:xfrm>
           <a:prstGeom prst="rect">

</xml_diff>